<commit_message>
Create PPTX from New Request.Generate brothers queries Changing the where condition attribute
</commit_message>
<xml_diff>
--- a/ppt/slideshow2.pptx
+++ b/ppt/slideshow2.pptx
@@ -490,7 +490,92 @@
 </p:notes>
 </file>
 
-<file path=ppt\notesSlides\notesSlide2.xml>
+<file path=ppt\notesSlides\notesSlide2.xml><?xml version="1.0" encoding="utf-8"?>
+<p:notes xmlns:a="http://schemas.openxmlformats.org/drawingml/2006/main" xmlns:r="http://schemas.openxmlformats.org/officeDocument/2006/relationships" xmlns:p="http://schemas.openxmlformats.org/presentationml/2006/main">
+  <p:cSld>
+    <p:spTree>
+      <p:nvGrpSpPr>
+        <p:cNvPr id="1" name=""/>
+        <p:cNvGrpSpPr/>
+        <p:nvPr/>
+      </p:nvGrpSpPr>
+      <p:grpSpPr>
+        <a:xfrm>
+          <a:off x="0" y="0"/>
+          <a:ext cx="0" cy="0"/>
+          <a:chOff x="0" y="0"/>
+          <a:chExt cx="0" cy="0"/>
+        </a:xfrm>
+      </p:grpSpPr>
+      <p:sp>
+        <p:nvSpPr>
+          <p:cNvPr id="2" name="Slide Image Placeholder 1"/>
+          <p:cNvSpPr>
+            <a:spLocks noGrp="1" noRot="1" noChangeAspect="1"/>
+          </p:cNvSpPr>
+          <p:nvPr>
+            <p:ph type="sldImg"/>
+          </p:nvPr>
+        </p:nvSpPr>
+        <p:spPr/>
+      </p:sp>
+      <p:sp>
+        <p:nvSpPr>
+          <p:cNvPr id="3" name="Notes Placeholder 2"/>
+          <p:cNvSpPr>
+            <a:spLocks noGrp="1"/>
+          </p:cNvSpPr>
+          <p:nvPr>
+            <p:ph type="body" idx="1"/>
+          </p:nvPr>
+        </p:nvSpPr>
+        <p:spPr/>
+        <p:txBody>
+          <a:bodyPr/>
+          <a:lstStyle/>
+          <a:p>
+            <a:r>
+              <a:rPr lang="en-US" smtClean="0"/>
+              <a:t>notes</a:t>
+            </a:r>
+            <a:endParaRPr lang="en-US"/>
+          </a:p>
+        </p:txBody>
+      </p:sp>
+      <p:sp>
+        <p:nvSpPr>
+          <p:cNvPr id="4" name="Slide Number Placeholder 3"/>
+          <p:cNvSpPr>
+            <a:spLocks noGrp="1"/>
+          </p:cNvSpPr>
+          <p:nvPr>
+            <p:ph type="sldNum" sz="quarter" idx="10"/>
+          </p:nvPr>
+        </p:nvSpPr>
+        <p:spPr/>
+        <p:txBody>
+          <a:bodyPr/>
+          <a:lstStyle/>
+          <a:p>
+            <a:fld id="{16159E77-4725-4CB7-9EC4-5EC2DD79573E}" type="slidenum">
+              <a:rPr lang="en-US" smtClean="0"/>
+              <a:t>1</a:t>
+            </a:fld>
+            <a:endParaRPr lang="en-US"/>
+          </a:p>
+        </p:txBody>
+      </p:sp>
+    </p:spTree>
+    <p:extLst>
+      <p:ext uri="{BB962C8B-B14F-4D97-AF65-F5344CB8AC3E}">
+        <p14:creationId xmlns:p14="http://schemas.microsoft.com/office/powerpoint/2010/main" val="14536787"/>
+      </p:ext>
+    </p:extLst>
+  </p:cSld>
+  <p:clrMapOvr>
+    <a:masterClrMapping/>
+  </p:clrMapOvr>
+</p:notes>
 </file>
 
 <file path=ppt\presProps.xml><?xml version="1.0" encoding="utf-8"?>
@@ -3583,7 +3668,7 @@
 </file>
 
 <file path=ppt\slides\slide2.xml><?xml version="1.0" encoding="utf-8"?>
-<p:sld xmlns:p="http://schemas.openxmlformats.org/presentationml/2006/main" xmlns:a="http://schemas.openxmlformats.org/drawingml/2006/main" xmlns:xsi="http://www.w3.org/2001/XMLSchema-instance">
+<p:sld xmlns:r="http://schemas.openxmlformats.org/officeDocument/2006/relationships" xmlns:p="http://schemas.openxmlformats.org/presentationml/2006/main" xmlns:a="http://schemas.openxmlformats.org/drawingml/2006/main" xmlns:xsi="http://www.w3.org/2001/XMLSchema-instance">
   <p:cSld>
     <p:spTree>
       <p:nvGrpSpPr>
@@ -5161,11 +5246,143 @@
           </a:graphicData>
         </a:graphic>
       </p:graphicFrame>
+      <p:pic>
+        <p:nvPicPr>
+          <p:cNvPr id="4" name="FJYP7I.wav">
+            <a:hlinkClick r:id="" action="ppaction://media"/>
+          </p:cNvPr>
+          <p:cNvPicPr>
+            <a:picLocks noChangeAspect="1"/>
+          </p:cNvPicPr>
+          <p:nvPr>
+            <a:audioFile r:link="rId4"/>
+            <p:extLst>
+              <p:ext uri="{DAA4B4D4-6D71-4841-9C94-3DE7FCFB9230}">
+                <p14:media xmlns:p14="http://schemas.microsoft.com/office/powerpoint/2010/main" r:embed="rId3"/>
+              </p:ext>
+            </p:extLst>
+          </p:nvPr>
+        </p:nvPicPr>
+        <p:blipFill>
+          <a:blip r:embed="rId5"/>
+          <a:stretch>
+            <a:fillRect/>
+          </a:stretch>
+        </p:blipFill>
+        <p:spPr>
+          <a:xfrm>
+            <a:off x="0" y="0"/>
+            <a:ext cx="609600" cy="609600"/>
+          </a:xfrm>
+          <a:prstGeom prst="rect">
+            <a:avLst/>
+          </a:prstGeom>
+        </p:spPr>
+      </p:pic>
     </p:spTree>
   </p:cSld>
   <p:clrMapOvr>
     <a:masterClrMapping/>
   </p:clrMapOvr>
+  <mc:AlternateContent xmlns:mc="http://schemas.openxmlformats.org/markup-compatibility/2006">
+    <mc:Choice xmlns:p14="http://schemas.microsoft.com/office/powerpoint/2010/main" Requires="p14">
+      <p:transition p14:dur="100" advClick="0" advTm="10000">
+        <p:cut/>
+      </p:transition>
+    </mc:Choice>
+    <mc:Fallback>
+      <p:transition advClick="0" advTm="10000">
+        <p:cut/>
+      </p:transition>
+    </mc:Fallback>
+  </mc:AlternateContent>
+  <p:timing>
+    <p:tnLst>
+      <p:par>
+        <p:cTn id="1" dur="indefinite" restart="never" nodeType="tmRoot">
+          <p:childTnLst>
+            <p:seq concurrent="1" nextAc="seek">
+              <p:cTn id="2" dur="indefinite" nodeType="mainSeq">
+                <p:childTnLst>
+                  <p:par>
+                    <p:cTn id="3" fill="hold">
+                      <p:stCondLst>
+                        <p:cond delay="indefinite"/>
+                        <p:cond evt="onBegin" delay="0">
+                          <p:tn val="2"/>
+                        </p:cond>
+                      </p:stCondLst>
+                      <p:childTnLst>
+                        <p:par>
+                          <p:cTn id="4" fill="hold">
+                            <p:stCondLst>
+                              <p:cond delay="0"/>
+                            </p:stCondLst>
+                            <p:childTnLst>
+                              <p:par>
+                                <p:cTn id="5" presetID="1" presetClass="mediacall" presetSubtype="0" fill="hold" nodeType="afterEffect">
+                                  <p:stCondLst>
+                                    <p:cond delay="0"/>
+                                  </p:stCondLst>
+                                  <p:childTnLst>
+                                    <p:cmd type="call" cmd="playFrom(0.0)">
+                                      <p:cBhvr>
+                                        <p:cTn id="6" dur="4169" fill="hold"/>
+                                        <p:tgtEl>
+                                          <p:spTgt spid="4"/>
+                                        </p:tgtEl>
+                                      </p:cBhvr>
+                                    </p:cmd>
+                                  </p:childTnLst>
+                                </p:cTn>
+                              </p:par>
+                            </p:childTnLst>
+                          </p:cTn>
+                        </p:par>
+                      </p:childTnLst>
+                    </p:cTn>
+                  </p:par>
+                </p:childTnLst>
+              </p:cTn>
+              <p:prevCondLst>
+                <p:cond evt="onPrev" delay="0">
+                  <p:tgtEl>
+                    <p:sldTgt/>
+                  </p:tgtEl>
+                </p:cond>
+              </p:prevCondLst>
+              <p:nextCondLst>
+                <p:cond evt="onNext" delay="0">
+                  <p:tgtEl>
+                    <p:sldTgt/>
+                  </p:tgtEl>
+                </p:cond>
+              </p:nextCondLst>
+            </p:seq>
+            <p:audio>
+              <p:cMediaNode vol="100000">
+                <p:cTn id="7" fill="hold" display="0">
+                  <p:stCondLst>
+                    <p:cond delay="indefinite"/>
+                  </p:stCondLst>
+                  <p:endCondLst>
+                    <p:cond evt="onStopAudio" delay="0">
+                      <p:tgtEl>
+                        <p:sldTgt/>
+                      </p:tgtEl>
+                    </p:cond>
+                  </p:endCondLst>
+                </p:cTn>
+                <p:tgtEl>
+                  <p:spTgt spid="4"/>
+                </p:tgtEl>
+              </p:cMediaNode>
+            </p:audio>
+          </p:childTnLst>
+        </p:cTn>
+      </p:par>
+    </p:tnLst>
+  </p:timing>
 </p:sld>
 </file>
 

</xml_diff>

<commit_message>
a little changes to fix merge problem
</commit_message>
<xml_diff>
--- a/ppt/slideshow2.pptx
+++ b/ppt/slideshow2.pptx
@@ -3969,7 +3969,7 @@
                         <a:rPr lang="en-US" sz="1200">
                           <a:latin typeface="Arial"/>
                         </a:rPr>
-                        <a:t>40.7937</a:t>
+                        <a:t>40.5085</a:t>
                       </a:r>
                     </a:p>
                   </a:txBody>
@@ -4000,7 +4000,7 @@
                         <a:rPr lang="en-US" sz="1200">
                           <a:latin typeface="Arial"/>
                         </a:rPr>
-                        <a:t>46.5354</a:t>
+                        <a:t>46.8061</a:t>
                       </a:r>
                     </a:p>
                   </a:txBody>
@@ -4031,7 +4031,7 @@
                         <a:rPr lang="en-US" sz="1200">
                           <a:latin typeface="Arial"/>
                         </a:rPr>
-                        <a:t>39.8909</a:t>
+                        <a:t>39.8868</a:t>
                       </a:r>
                     </a:p>
                   </a:txBody>
@@ -4062,7 +4062,7 @@
                         <a:rPr lang="en-US" sz="1200">
                           <a:latin typeface="Arial"/>
                         </a:rPr>
-                        <a:t>41.1119</a:t>
+                        <a:t>41.0511</a:t>
                       </a:r>
                     </a:p>
                   </a:txBody>
@@ -4093,7 +4093,7 @@
                         <a:rPr lang="en-US" sz="1200">
                           <a:latin typeface="Arial"/>
                         </a:rPr>
-                        <a:t>42.1587</a:t>
+                        <a:t>42.4656</a:t>
                       </a:r>
                     </a:p>
                   </a:txBody>
@@ -4124,7 +4124,7 @@
                         <a:rPr lang="en-US" sz="1200">
                           <a:latin typeface="Arial"/>
                         </a:rPr>
-                        <a:t>42.3147</a:t>
+                        <a:t>42.4332</a:t>
                       </a:r>
                     </a:p>
                   </a:txBody>
@@ -4188,7 +4188,7 @@
                         <a:rPr lang="en-US" sz="1200">
                           <a:latin typeface="Arial"/>
                         </a:rPr>
-                        <a:t>38.2576</a:t>
+                        <a:t>39.0196</a:t>
                       </a:r>
                     </a:p>
                   </a:txBody>
@@ -4250,7 +4250,7 @@
                         <a:rPr lang="en-US" sz="1200">
                           <a:latin typeface="Arial"/>
                         </a:rPr>
-                        <a:t>34.5536</a:t>
+                        <a:t>32.4688</a:t>
                       </a:r>
                     </a:p>
                   </a:txBody>
@@ -4281,7 +4281,7 @@
                         <a:rPr lang="en-US" sz="1200">
                           <a:latin typeface="Arial"/>
                         </a:rPr>
-                        <a:t>43.5000</a:t>
+                        <a:t>45.1304</a:t>
                       </a:r>
                     </a:p>
                   </a:txBody>
@@ -4312,7 +4312,7 @@
                         <a:rPr lang="en-US" sz="1200">
                           <a:latin typeface="Arial"/>
                         </a:rPr>
-                        <a:t>37.8846</a:t>
+                        <a:t>41.6500</a:t>
                       </a:r>
                     </a:p>
                   </a:txBody>
@@ -4343,7 +4343,7 @@
                         <a:rPr lang="en-US" sz="1200">
                           <a:latin typeface="Arial"/>
                         </a:rPr>
-                        <a:t>39.7607</a:t>
+                        <a:t>41.1787</a:t>
                       </a:r>
                     </a:p>
                   </a:txBody>
@@ -4562,7 +4562,7 @@
                         <a:rPr lang="en-US" sz="1200">
                           <a:latin typeface="Arial"/>
                         </a:rPr>
-                        <a:t>32.7972</a:t>
+                        <a:t>39.8750</a:t>
                       </a:r>
                     </a:p>
                   </a:txBody>
@@ -4626,7 +4626,7 @@
                         <a:rPr lang="en-US" sz="1200">
                           <a:latin typeface="Arial"/>
                         </a:rPr>
-                        <a:t>39.2857</a:t>
+                        <a:t>39.1667</a:t>
                       </a:r>
                     </a:p>
                   </a:txBody>
@@ -4657,7 +4657,7 @@
                         <a:rPr lang="en-US" sz="1200">
                           <a:latin typeface="Arial"/>
                         </a:rPr>
-                        <a:t>45.2000</a:t>
+                        <a:t>47.7500</a:t>
                       </a:r>
                     </a:p>
                   </a:txBody>
@@ -4688,7 +4688,7 @@
                         <a:rPr lang="en-US" sz="1200">
                           <a:latin typeface="Arial"/>
                         </a:rPr>
-                        <a:t>36.9231</a:t>
+                        <a:t>39.2000</a:t>
                       </a:r>
                     </a:p>
                   </a:txBody>
@@ -4719,7 +4719,7 @@
                         <a:rPr lang="en-US" sz="1200">
                           <a:latin typeface="Arial"/>
                         </a:rPr>
-                        <a:t>41.5455</a:t>
+                        <a:t>42.4444</a:t>
                       </a:r>
                     </a:p>
                   </a:txBody>
@@ -4750,7 +4750,7 @@
                         <a:rPr lang="en-US" sz="1200">
                           <a:latin typeface="Arial"/>
                         </a:rPr>
-                        <a:t>40.8857</a:t>
+                        <a:t>40.2000</a:t>
                       </a:r>
                     </a:p>
                   </a:txBody>
@@ -4781,7 +4781,7 @@
                         <a:rPr lang="en-US" sz="1200">
                           <a:latin typeface="Arial"/>
                         </a:rPr>
-                        <a:t>40.7200</a:t>
+                        <a:t>41.4321</a:t>
                       </a:r>
                     </a:p>
                   </a:txBody>
@@ -4845,7 +4845,7 @@
                         <a:rPr lang="en-US" sz="1200">
                           <a:latin typeface="Arial"/>
                         </a:rPr>
-                        <a:t>39.2273</a:t>
+                        <a:t>39.0556</a:t>
                       </a:r>
                     </a:p>
                   </a:txBody>
@@ -4907,7 +4907,7 @@
                         <a:rPr lang="en-US" sz="1200">
                           <a:latin typeface="Arial"/>
                         </a:rPr>
-                        <a:t>32.6667</a:t>
+                        <a:t>34.2500</a:t>
                       </a:r>
                     </a:p>
                   </a:txBody>
@@ -4938,7 +4938,7 @@
                         <a:rPr lang="en-US" sz="1200">
                           <a:latin typeface="Arial"/>
                         </a:rPr>
-                        <a:t>40.2174</a:t>
+                        <a:t>41.1628</a:t>
                       </a:r>
                     </a:p>
                   </a:txBody>
@@ -4969,7 +4969,7 @@
                         <a:rPr lang="en-US" sz="1200">
                           <a:latin typeface="Arial"/>
                         </a:rPr>
-                        <a:t>33.8667</a:t>
+                        <a:t>32.9231</a:t>
                       </a:r>
                     </a:p>
                   </a:txBody>
@@ -5000,7 +5000,7 @@
                         <a:rPr lang="en-US" sz="1200">
                           <a:latin typeface="Arial"/>
                         </a:rPr>
-                        <a:t>37.8295</a:t>
+                        <a:t>38.0518</a:t>
                       </a:r>
                     </a:p>
                   </a:txBody>
@@ -5064,7 +5064,7 @@
                         <a:rPr lang="en-US" sz="1200">
                           <a:latin typeface="Arial"/>
                         </a:rPr>
-                        <a:t>44.7083</a:t>
+                        <a:t>46.4286</a:t>
                       </a:r>
                     </a:p>
                   </a:txBody>
@@ -5095,7 +5095,7 @@
                         <a:rPr lang="en-US" sz="1200">
                           <a:latin typeface="Arial"/>
                         </a:rPr>
-                        <a:t>51.8077</a:t>
+                        <a:t>52.7917</a:t>
                       </a:r>
                     </a:p>
                   </a:txBody>
@@ -5126,7 +5126,7 @@
                         <a:rPr lang="en-US" sz="1200">
                           <a:latin typeface="Arial"/>
                         </a:rPr>
-                        <a:t>39.1951</a:t>
+                        <a:t>38.8158</a:t>
                       </a:r>
                     </a:p>
                   </a:txBody>
@@ -5157,7 +5157,7 @@
                         <a:rPr lang="en-US" sz="1200">
                           <a:latin typeface="Arial"/>
                         </a:rPr>
-                        <a:t>38.6783</a:t>
+                        <a:t>39.0211</a:t>
                       </a:r>
                     </a:p>
                   </a:txBody>
@@ -5188,7 +5188,7 @@
                         <a:rPr lang="en-US" sz="1200">
                           <a:latin typeface="Arial"/>
                         </a:rPr>
-                        <a:t>49.7288</a:t>
+                        <a:t>50.5526</a:t>
                       </a:r>
                     </a:p>
                   </a:txBody>
@@ -5219,7 +5219,7 @@
                         <a:rPr lang="en-US" sz="1200">
                           <a:latin typeface="Arial"/>
                         </a:rPr>
-                        <a:t>44.7690</a:t>
+                        <a:t>45.1463</a:t>
                       </a:r>
                     </a:p>
                   </a:txBody>
@@ -5248,7 +5248,7 @@
       </p:graphicFrame>
       <p:pic>
         <p:nvPicPr>
-          <p:cNvPr id="4" name="FJYP7I.wav">
+          <p:cNvPr id="4" name="O70SXSWC9.wav">
             <a:hlinkClick r:id="" action="ppaction://media"/>
           </p:cNvPr>
           <p:cNvPicPr>

</xml_diff>